<commit_message>
added bagging vs. spheres and more references
</commit_message>
<xml_diff>
--- a/materials/Bagging_random_inodis.pptx
+++ b/materials/Bagging_random_inodis.pptx
@@ -104,6 +104,11 @@
       </a:defRPr>
     </a:lvl9pPr>
   </p:defaultTextStyle>
+  <p:extLst>
+    <p:ext uri="{EFAFB233-063F-42B5-8137-9DF3F51BA10A}">
+      <p15:sldGuideLst xmlns:p15="http://schemas.microsoft.com/office/powerpoint/2012/main"/>
+    </p:ext>
+  </p:extLst>
 </p:presentation>
 </file>
 
@@ -238,7 +243,7 @@
           <a:p>
             <a:fld id="{DF01697D-237B-4FB5-B839-CD9EB51CCC42}" type="datetimeFigureOut">
               <a:rPr lang="en-US" smtClean="0"/>
-              <a:t>6/26/2017</a:t>
+              <a:t>6/27/2017</a:t>
             </a:fld>
             <a:endParaRPr lang="en-US"/>
           </a:p>
@@ -408,7 +413,7 @@
           <a:p>
             <a:fld id="{DF01697D-237B-4FB5-B839-CD9EB51CCC42}" type="datetimeFigureOut">
               <a:rPr lang="en-US" smtClean="0"/>
-              <a:t>6/26/2017</a:t>
+              <a:t>6/27/2017</a:t>
             </a:fld>
             <a:endParaRPr lang="en-US"/>
           </a:p>
@@ -588,7 +593,7 @@
           <a:p>
             <a:fld id="{DF01697D-237B-4FB5-B839-CD9EB51CCC42}" type="datetimeFigureOut">
               <a:rPr lang="en-US" smtClean="0"/>
-              <a:t>6/26/2017</a:t>
+              <a:t>6/27/2017</a:t>
             </a:fld>
             <a:endParaRPr lang="en-US"/>
           </a:p>
@@ -758,7 +763,7 @@
           <a:p>
             <a:fld id="{DF01697D-237B-4FB5-B839-CD9EB51CCC42}" type="datetimeFigureOut">
               <a:rPr lang="en-US" smtClean="0"/>
-              <a:t>6/26/2017</a:t>
+              <a:t>6/27/2017</a:t>
             </a:fld>
             <a:endParaRPr lang="en-US"/>
           </a:p>
@@ -1004,7 +1009,7 @@
           <a:p>
             <a:fld id="{DF01697D-237B-4FB5-B839-CD9EB51CCC42}" type="datetimeFigureOut">
               <a:rPr lang="en-US" smtClean="0"/>
-              <a:t>6/26/2017</a:t>
+              <a:t>6/27/2017</a:t>
             </a:fld>
             <a:endParaRPr lang="en-US"/>
           </a:p>
@@ -1236,7 +1241,7 @@
           <a:p>
             <a:fld id="{DF01697D-237B-4FB5-B839-CD9EB51CCC42}" type="datetimeFigureOut">
               <a:rPr lang="en-US" smtClean="0"/>
-              <a:t>6/26/2017</a:t>
+              <a:t>6/27/2017</a:t>
             </a:fld>
             <a:endParaRPr lang="en-US"/>
           </a:p>
@@ -1603,7 +1608,7 @@
           <a:p>
             <a:fld id="{DF01697D-237B-4FB5-B839-CD9EB51CCC42}" type="datetimeFigureOut">
               <a:rPr lang="en-US" smtClean="0"/>
-              <a:t>6/26/2017</a:t>
+              <a:t>6/27/2017</a:t>
             </a:fld>
             <a:endParaRPr lang="en-US"/>
           </a:p>
@@ -1721,7 +1726,7 @@
           <a:p>
             <a:fld id="{DF01697D-237B-4FB5-B839-CD9EB51CCC42}" type="datetimeFigureOut">
               <a:rPr lang="en-US" smtClean="0"/>
-              <a:t>6/26/2017</a:t>
+              <a:t>6/27/2017</a:t>
             </a:fld>
             <a:endParaRPr lang="en-US"/>
           </a:p>
@@ -1816,7 +1821,7 @@
           <a:p>
             <a:fld id="{DF01697D-237B-4FB5-B839-CD9EB51CCC42}" type="datetimeFigureOut">
               <a:rPr lang="en-US" smtClean="0"/>
-              <a:t>6/26/2017</a:t>
+              <a:t>6/27/2017</a:t>
             </a:fld>
             <a:endParaRPr lang="en-US"/>
           </a:p>
@@ -2093,7 +2098,7 @@
           <a:p>
             <a:fld id="{DF01697D-237B-4FB5-B839-CD9EB51CCC42}" type="datetimeFigureOut">
               <a:rPr lang="en-US" smtClean="0"/>
-              <a:t>6/26/2017</a:t>
+              <a:t>6/27/2017</a:t>
             </a:fld>
             <a:endParaRPr lang="en-US"/>
           </a:p>
@@ -2346,7 +2351,7 @@
           <a:p>
             <a:fld id="{DF01697D-237B-4FB5-B839-CD9EB51CCC42}" type="datetimeFigureOut">
               <a:rPr lang="en-US" smtClean="0"/>
-              <a:t>6/26/2017</a:t>
+              <a:t>6/27/2017</a:t>
             </a:fld>
             <a:endParaRPr lang="en-US"/>
           </a:p>
@@ -2559,7 +2564,7 @@
           <a:p>
             <a:fld id="{DF01697D-237B-4FB5-B839-CD9EB51CCC42}" type="datetimeFigureOut">
               <a:rPr lang="en-US" smtClean="0"/>
-              <a:t>6/26/2017</a:t>
+              <a:t>6/27/2017</a:t>
             </a:fld>
             <a:endParaRPr lang="en-US"/>
           </a:p>

</xml_diff>